<commit_message>
noise injected to weight and trained also analysed
</commit_message>
<xml_diff>
--- a/Task_ppt.pptx
+++ b/Task_ppt.pptx
@@ -10,8 +10,6 @@
     <p:sldId id="259" r:id="rId4"/>
     <p:sldId id="260" r:id="rId5"/>
     <p:sldId id="261" r:id="rId6"/>
-    <p:sldId id="262" r:id="rId7"/>
-    <p:sldId id="265" r:id="rId8"/>
   </p:sldIdLst>
   <p:sldSz cx="12192000" cy="6858000"/>
   <p:notesSz cx="6858000" cy="9144000"/>
@@ -321,7 +319,7 @@
           <a:p>
             <a:fld id="{44212539-063D-4494-B30A-40E744319C69}" type="slidenum">
               <a:rPr lang="en-GB" smtClean="0"/>
-              <a:t>‹Nr.›</a:t>
+              <a:t>‹#›</a:t>
             </a:fld>
             <a:endParaRPr lang="en-GB"/>
           </a:p>
@@ -521,7 +519,7 @@
           <a:p>
             <a:fld id="{44212539-063D-4494-B30A-40E744319C69}" type="slidenum">
               <a:rPr lang="en-GB" smtClean="0"/>
-              <a:t>‹Nr.›</a:t>
+              <a:t>‹#›</a:t>
             </a:fld>
             <a:endParaRPr lang="en-GB"/>
           </a:p>
@@ -731,7 +729,7 @@
           <a:p>
             <a:fld id="{44212539-063D-4494-B30A-40E744319C69}" type="slidenum">
               <a:rPr lang="en-GB" smtClean="0"/>
-              <a:t>‹Nr.›</a:t>
+              <a:t>‹#›</a:t>
             </a:fld>
             <a:endParaRPr lang="en-GB"/>
           </a:p>
@@ -931,7 +929,7 @@
           <a:p>
             <a:fld id="{44212539-063D-4494-B30A-40E744319C69}" type="slidenum">
               <a:rPr lang="en-GB" smtClean="0"/>
-              <a:t>‹Nr.›</a:t>
+              <a:t>‹#›</a:t>
             </a:fld>
             <a:endParaRPr lang="en-GB"/>
           </a:p>
@@ -1207,7 +1205,7 @@
           <a:p>
             <a:fld id="{44212539-063D-4494-B30A-40E744319C69}" type="slidenum">
               <a:rPr lang="en-GB" smtClean="0"/>
-              <a:t>‹Nr.›</a:t>
+              <a:t>‹#›</a:t>
             </a:fld>
             <a:endParaRPr lang="en-GB"/>
           </a:p>
@@ -1475,7 +1473,7 @@
           <a:p>
             <a:fld id="{44212539-063D-4494-B30A-40E744319C69}" type="slidenum">
               <a:rPr lang="en-GB" smtClean="0"/>
-              <a:t>‹Nr.›</a:t>
+              <a:t>‹#›</a:t>
             </a:fld>
             <a:endParaRPr lang="en-GB"/>
           </a:p>
@@ -1890,7 +1888,7 @@
           <a:p>
             <a:fld id="{44212539-063D-4494-B30A-40E744319C69}" type="slidenum">
               <a:rPr lang="en-GB" smtClean="0"/>
-              <a:t>‹Nr.›</a:t>
+              <a:t>‹#›</a:t>
             </a:fld>
             <a:endParaRPr lang="en-GB"/>
           </a:p>
@@ -2032,7 +2030,7 @@
           <a:p>
             <a:fld id="{44212539-063D-4494-B30A-40E744319C69}" type="slidenum">
               <a:rPr lang="en-GB" smtClean="0"/>
-              <a:t>‹Nr.›</a:t>
+              <a:t>‹#›</a:t>
             </a:fld>
             <a:endParaRPr lang="en-GB"/>
           </a:p>
@@ -2145,7 +2143,7 @@
           <a:p>
             <a:fld id="{44212539-063D-4494-B30A-40E744319C69}" type="slidenum">
               <a:rPr lang="en-GB" smtClean="0"/>
-              <a:t>‹Nr.›</a:t>
+              <a:t>‹#›</a:t>
             </a:fld>
             <a:endParaRPr lang="en-GB"/>
           </a:p>
@@ -2458,7 +2456,7 @@
           <a:p>
             <a:fld id="{44212539-063D-4494-B30A-40E744319C69}" type="slidenum">
               <a:rPr lang="en-GB" smtClean="0"/>
-              <a:t>‹Nr.›</a:t>
+              <a:t>‹#›</a:t>
             </a:fld>
             <a:endParaRPr lang="en-GB"/>
           </a:p>
@@ -2747,7 +2745,7 @@
           <a:p>
             <a:fld id="{44212539-063D-4494-B30A-40E744319C69}" type="slidenum">
               <a:rPr lang="en-GB" smtClean="0"/>
-              <a:t>‹Nr.›</a:t>
+              <a:t>‹#›</a:t>
             </a:fld>
             <a:endParaRPr lang="en-GB"/>
           </a:p>
@@ -3026,7 +3024,7 @@
           <a:p>
             <a:fld id="{44212539-063D-4494-B30A-40E744319C69}" type="slidenum">
               <a:rPr lang="en-GB" smtClean="0"/>
-              <a:t>‹Nr.›</a:t>
+              <a:t>‹#›</a:t>
             </a:fld>
             <a:endParaRPr lang="en-GB"/>
           </a:p>
@@ -3631,8 +3629,8 @@
         </p:nvSpPr>
         <p:spPr>
           <a:xfrm>
-            <a:off x="838200" y="418809"/>
-            <a:ext cx="10515600" cy="6191396"/>
+            <a:off x="0" y="349624"/>
+            <a:ext cx="12938138" cy="6508376"/>
           </a:xfrm>
         </p:spPr>
         <p:txBody>
@@ -3642,65 +3640,89 @@
           <a:lstStyle/>
           <a:p>
             <a:r>
-              <a:rPr lang="en-GB" dirty="0"/>
+              <a:rPr lang="en-GB" dirty="0">
+                <a:highlight>
+                  <a:srgbClr val="00FF00"/>
+                </a:highlight>
+              </a:rPr>
               <a:t>Analyse how the optimizer space looks </a:t>
             </a:r>
           </a:p>
           <a:p>
             <a:pPr lvl="1"/>
             <a:r>
-              <a:rPr lang="en-GB" dirty="0"/>
+              <a:rPr lang="en-GB" dirty="0">
+                <a:highlight>
+                  <a:srgbClr val="00FF00"/>
+                </a:highlight>
+              </a:rPr>
               <a:t>Once without the ReLU and once with</a:t>
             </a:r>
           </a:p>
           <a:p>
             <a:pPr lvl="2"/>
             <a:r>
-              <a:rPr lang="en-GB" dirty="0"/>
+              <a:rPr lang="en-GB" dirty="0">
+                <a:highlight>
+                  <a:srgbClr val="00FF00"/>
+                </a:highlight>
+              </a:rPr>
               <a:t>Do we have constraints =&gt; lossless compression</a:t>
             </a:r>
           </a:p>
           <a:p>
             <a:pPr lvl="3"/>
             <a:r>
-              <a:rPr lang="en-GB" dirty="0"/>
+              <a:rPr lang="en-GB" dirty="0">
+                <a:highlight>
+                  <a:srgbClr val="00FF00"/>
+                </a:highlight>
+              </a:rPr>
               <a:t>We want to reconstruct exactly one selected datapoint in the signal (this is a constraint)</a:t>
             </a:r>
           </a:p>
           <a:p>
             <a:pPr lvl="2"/>
             <a:r>
-              <a:rPr lang="en-GB" dirty="0"/>
+              <a:rPr lang="en-GB" dirty="0">
+                <a:highlight>
+                  <a:srgbClr val="00FF00"/>
+                </a:highlight>
+              </a:rPr>
               <a:t>The accuracy of the optimization (discrete or continuous)</a:t>
             </a:r>
           </a:p>
           <a:p>
             <a:pPr lvl="2"/>
             <a:r>
-              <a:rPr lang="en-GB" dirty="0"/>
+              <a:rPr lang="en-GB" dirty="0">
+                <a:highlight>
+                  <a:srgbClr val="00FF00"/>
+                </a:highlight>
+              </a:rPr>
               <a:t>Fix the weights and only vary like 10 of them with both matrixes</a:t>
             </a:r>
           </a:p>
           <a:p>
             <a:pPr lvl="2"/>
             <a:r>
-              <a:rPr lang="en-GB" dirty="0"/>
+              <a:rPr lang="en-GB" dirty="0">
+                <a:highlight>
+                  <a:srgbClr val="00FF00"/>
+                </a:highlight>
+              </a:rPr>
               <a:t>Brute force changes in the matrix to sample the noisiness of the optimization space</a:t>
             </a:r>
           </a:p>
           <a:p>
             <a:pPr lvl="3"/>
             <a:r>
-              <a:rPr lang="en-GB" dirty="0"/>
-              <a:t>Statistical noise added, or </a:t>
-            </a:r>
-            <a:r>
-              <a:rPr lang="en-GB" dirty="0" err="1"/>
-              <a:t>specle</a:t>
-            </a:r>
-            <a:r>
-              <a:rPr lang="en-GB" dirty="0"/>
-              <a:t> noise added</a:t>
+              <a:rPr lang="en-GB" dirty="0">
+                <a:highlight>
+                  <a:srgbClr val="00FF00"/>
+                </a:highlight>
+              </a:rPr>
+              <a:t>Statistical noise added, or speckle noise added</a:t>
             </a:r>
           </a:p>
           <a:p>
@@ -3729,7 +3751,11 @@
           </a:p>
           <a:p>
             <a:r>
-              <a:rPr lang="en-GB" dirty="0"/>
+              <a:rPr lang="en-GB" dirty="0">
+                <a:highlight>
+                  <a:srgbClr val="00FF00"/>
+                </a:highlight>
+              </a:rPr>
               <a:t>Simulated annealing as a fourth optimizer technique</a:t>
             </a:r>
           </a:p>
@@ -3754,26 +3780,51 @@
           <a:p>
             <a:pPr lvl="1"/>
             <a:r>
+              <a:rPr lang="en-GB" dirty="0">
+                <a:highlight>
+                  <a:srgbClr val="FFFF00"/>
+                </a:highlight>
+              </a:rPr>
+              <a:t>Is the optimization space noisy</a:t>
+            </a:r>
+          </a:p>
+          <a:p>
+            <a:pPr lvl="1"/>
+            <a:r>
+              <a:rPr lang="en-GB" dirty="0">
+                <a:highlight>
+                  <a:srgbClr val="FFFF00"/>
+                </a:highlight>
+              </a:rPr>
+              <a:t>Does the optimizer converge (finds the true reconstruction of the signal)</a:t>
+            </a:r>
+          </a:p>
+          <a:p>
+            <a:pPr lvl="1"/>
+            <a:r>
+              <a:rPr lang="en-GB" dirty="0">
+                <a:highlight>
+                  <a:srgbClr val="FFFF00"/>
+                </a:highlight>
+              </a:rPr>
+              <a:t>Does it find the global maximum/minimum</a:t>
+            </a:r>
+          </a:p>
+          <a:p>
+            <a:pPr lvl="1"/>
+            <a:r>
               <a:rPr lang="en-GB" dirty="0"/>
-              <a:t>Is the optimization space noisy</a:t>
+              <a:t>use a SSIM metric in our loss function, build a feature extractor </a:t>
             </a:r>
           </a:p>
           <a:p>
             <a:pPr lvl="1"/>
-            <a:r>
-              <a:rPr lang="en-GB" dirty="0"/>
-              <a:t>Does the optimizer converge (finds the true reconstruction of the signal)</a:t>
-            </a:r>
-          </a:p>
-          <a:p>
-            <a:pPr lvl="1"/>
-            <a:r>
-              <a:rPr lang="en-GB" dirty="0"/>
-              <a:t>Does it find the global maximum/minimum</a:t>
-            </a:r>
-          </a:p>
-          <a:p>
-            <a:pPr lvl="1"/>
+            <a:endParaRPr lang="en-GB" dirty="0"/>
+          </a:p>
+          <a:p>
+            <a:endParaRPr lang="en-GB" dirty="0"/>
+          </a:p>
+          <a:p>
             <a:endParaRPr lang="en-GB" dirty="0"/>
           </a:p>
           <a:p>
@@ -3816,1624 +3867,134 @@
       </p:grpSpPr>
       <p:sp>
         <p:nvSpPr>
-          <p:cNvPr id="2" name="Titel 1">
-            <a:extLst>
-              <a:ext uri="{FF2B5EF4-FFF2-40B4-BE49-F238E27FC236}">
-                <a16:creationId xmlns:a16="http://schemas.microsoft.com/office/drawing/2014/main" id="{3E781063-4A80-5B73-6790-464A0928C206}"/>
-              </a:ext>
-            </a:extLst>
-          </p:cNvPr>
-          <p:cNvSpPr>
-            <a:spLocks noGrp="1"/>
-          </p:cNvSpPr>
-          <p:nvPr>
-            <p:ph type="title"/>
-          </p:nvPr>
-        </p:nvSpPr>
-        <p:spPr>
-          <a:xfrm>
-            <a:off x="838200" y="365126"/>
-            <a:ext cx="10515600" cy="612096"/>
-          </a:xfrm>
-        </p:spPr>
+          <p:cNvPr id="3" name="Content Placeholder 2">
+            <a:extLst>
+              <a:ext uri="{FF2B5EF4-FFF2-40B4-BE49-F238E27FC236}">
+                <a16:creationId xmlns:a16="http://schemas.microsoft.com/office/drawing/2014/main" id="{160AC7A7-31B9-D059-F995-56DC3483DFF4}"/>
+              </a:ext>
+            </a:extLst>
+          </p:cNvPr>
+          <p:cNvSpPr>
+            <a:spLocks noGrp="1"/>
+          </p:cNvSpPr>
+          <p:nvPr>
+            <p:ph idx="1"/>
+          </p:nvPr>
+        </p:nvSpPr>
+        <p:spPr/>
         <p:txBody>
           <a:bodyPr>
-            <a:normAutofit fontScale="90000"/>
+            <a:normAutofit fontScale="92500" lnSpcReduction="20000"/>
           </a:bodyPr>
           <a:lstStyle/>
           <a:p>
             <a:r>
-              <a:rPr lang="en-GB" dirty="0"/>
-              <a:t>Solution Space</a:t>
-            </a:r>
-          </a:p>
-        </p:txBody>
-      </p:sp>
-      <p:sp>
-        <p:nvSpPr>
-          <p:cNvPr id="3" name="Inhaltsplatzhalter 2">
-            <a:extLst>
-              <a:ext uri="{FF2B5EF4-FFF2-40B4-BE49-F238E27FC236}">
-                <a16:creationId xmlns:a16="http://schemas.microsoft.com/office/drawing/2014/main" id="{DF09C157-A416-C18E-0307-6C0A251A6E2B}"/>
-              </a:ext>
-            </a:extLst>
-          </p:cNvPr>
-          <p:cNvSpPr>
-            <a:spLocks noGrp="1"/>
-          </p:cNvSpPr>
-          <p:nvPr>
-            <p:ph idx="1"/>
-          </p:nvPr>
-        </p:nvSpPr>
-        <p:spPr>
-          <a:xfrm>
-            <a:off x="838200" y="977222"/>
-            <a:ext cx="10515600" cy="5199741"/>
-          </a:xfrm>
-        </p:spPr>
-        <p:txBody>
-          <a:bodyPr/>
-          <a:lstStyle/>
-          <a:p>
-            <a:r>
-              <a:rPr lang="en-GB" dirty="0"/>
-              <a:t>What is the Solution space</a:t>
-            </a:r>
+              <a:rPr lang="en-US" dirty="0"/>
+              <a:t>Neural data compression introduction</a:t>
+            </a:r>
+          </a:p>
+          <a:p>
+            <a:r>
+              <a:rPr lang="en-US" dirty="0"/>
+              <a:t>Autoencoder/Backpropagation</a:t>
+            </a:r>
+          </a:p>
+          <a:p>
+            <a:r>
+              <a:rPr lang="en-US" dirty="0"/>
+              <a:t>Gradient descent optimizer we used- formulas, parameters we played (learning rate, activation function)</a:t>
+            </a:r>
+          </a:p>
+          <a:p>
+            <a:r>
+              <a:rPr lang="en-US" dirty="0"/>
+              <a:t>Swarm algorithm</a:t>
+            </a:r>
+          </a:p>
+          <a:p>
+            <a:r>
+              <a:rPr lang="en-US" dirty="0"/>
+              <a:t>Gaussian/</a:t>
+            </a:r>
+            <a:r>
+              <a:rPr lang="en-US" dirty="0">
+                <a:highlight>
+                  <a:srgbClr val="FFFF00"/>
+                </a:highlight>
+              </a:rPr>
+              <a:t>speckle noise </a:t>
+            </a:r>
+            <a:r>
+              <a:rPr lang="en-US" dirty="0"/>
+              <a:t>added to the weights to see—the sensitivity per layer – optimization space noise</a:t>
+            </a:r>
+          </a:p>
+          <a:p>
+            <a:r>
+              <a:rPr lang="en-US" dirty="0"/>
+              <a:t>Train the (super high noise)  weights with </a:t>
+            </a:r>
+            <a:r>
+              <a:rPr lang="en-US" dirty="0" err="1"/>
+              <a:t>adam</a:t>
+            </a:r>
+            <a:r>
+              <a:rPr lang="en-US" dirty="0"/>
+              <a:t>  to see </a:t>
+            </a:r>
+            <a:r>
+              <a:rPr lang="en-US" b="1" dirty="0">
+                <a:highlight>
+                  <a:srgbClr val="FFFF00"/>
+                </a:highlight>
+              </a:rPr>
+              <a:t>How sensitive the  convergence is </a:t>
+            </a:r>
+            <a:r>
+              <a:rPr lang="en-US" dirty="0">
+                <a:highlight>
+                  <a:srgbClr val="FFFF00"/>
+                </a:highlight>
+              </a:rPr>
+              <a:t>🎯 </a:t>
+            </a:r>
+            <a:r>
+              <a:rPr lang="en-US" b="1" dirty="0">
+                <a:highlight>
+                  <a:srgbClr val="FFFF00"/>
+                </a:highlight>
+              </a:rPr>
+              <a:t>If it can still reach the same global minimum</a:t>
+            </a:r>
+          </a:p>
+          <a:p>
+            <a:r>
+              <a:rPr lang="en-US" b="1" dirty="0"/>
+              <a:t>(learning rate plot)</a:t>
+            </a:r>
+          </a:p>
+          <a:p>
+            <a:r>
+              <a:rPr lang="en-US" b="1" dirty="0"/>
+              <a:t>conclusion</a:t>
+            </a:r>
+            <a:endParaRPr lang="en-US" dirty="0"/>
+          </a:p>
+          <a:p>
+            <a:endParaRPr lang="en-US" dirty="0"/>
+          </a:p>
+          <a:p>
+            <a:endParaRPr lang="en-US" dirty="0"/>
+          </a:p>
+          <a:p>
+            <a:endParaRPr lang="en-US" dirty="0"/>
           </a:p>
         </p:txBody>
       </p:sp>
     </p:spTree>
     <p:extLst>
       <p:ext uri="{BB962C8B-B14F-4D97-AF65-F5344CB8AC3E}">
-        <p14:creationId xmlns:p14="http://schemas.microsoft.com/office/powerpoint/2010/main" val="2242321926"/>
-      </p:ext>
-    </p:extLst>
-  </p:cSld>
-  <p:clrMapOvr>
-    <a:masterClrMapping/>
-  </p:clrMapOvr>
-</p:sld>
-</file>
-
-<file path=ppt/slides/slide6.xml><?xml version="1.0" encoding="utf-8"?>
-<p:sld xmlns:a="http://schemas.openxmlformats.org/drawingml/2006/main" xmlns:r="http://schemas.openxmlformats.org/officeDocument/2006/relationships" xmlns:p="http://schemas.openxmlformats.org/presentationml/2006/main">
-  <p:cSld>
-    <p:spTree>
-      <p:nvGrpSpPr>
-        <p:cNvPr id="1" name=""/>
-        <p:cNvGrpSpPr/>
-        <p:nvPr/>
-      </p:nvGrpSpPr>
-      <p:grpSpPr>
-        <a:xfrm>
-          <a:off x="0" y="0"/>
-          <a:ext cx="0" cy="0"/>
-          <a:chOff x="0" y="0"/>
-          <a:chExt cx="0" cy="0"/>
-        </a:xfrm>
-      </p:grpSpPr>
-      <p:sp>
-        <p:nvSpPr>
-          <p:cNvPr id="2" name="Titel 1">
-            <a:extLst>
-              <a:ext uri="{FF2B5EF4-FFF2-40B4-BE49-F238E27FC236}">
-                <a16:creationId xmlns:a16="http://schemas.microsoft.com/office/drawing/2014/main" id="{B9FB16E7-84EF-6F93-25DB-564D583A9EC2}"/>
-              </a:ext>
-            </a:extLst>
-          </p:cNvPr>
-          <p:cNvSpPr>
-            <a:spLocks noGrp="1"/>
-          </p:cNvSpPr>
-          <p:nvPr>
-            <p:ph type="title"/>
-          </p:nvPr>
-        </p:nvSpPr>
-        <p:spPr/>
-        <p:txBody>
-          <a:bodyPr/>
-          <a:lstStyle/>
-          <a:p>
-            <a:r>
-              <a:rPr lang="en-GB" dirty="0"/>
-              <a:t>Autoencoder</a:t>
-            </a:r>
-          </a:p>
-        </p:txBody>
-      </p:sp>
-      <mc:AlternateContent xmlns:mc="http://schemas.openxmlformats.org/markup-compatibility/2006">
-        <mc:Choice xmlns:a14="http://schemas.microsoft.com/office/drawing/2010/main" Requires="a14">
-          <p:sp>
-            <p:nvSpPr>
-              <p:cNvPr id="3" name="Inhaltsplatzhalter 2">
-                <a:extLst>
-                  <a:ext uri="{FF2B5EF4-FFF2-40B4-BE49-F238E27FC236}">
-                    <a16:creationId xmlns:a16="http://schemas.microsoft.com/office/drawing/2014/main" id="{CD895501-1B38-DC8B-0174-ADBB447E9B7F}"/>
-                  </a:ext>
-                </a:extLst>
-              </p:cNvPr>
-              <p:cNvSpPr>
-                <a:spLocks noGrp="1"/>
-              </p:cNvSpPr>
-              <p:nvPr>
-                <p:ph idx="1"/>
-              </p:nvPr>
-            </p:nvSpPr>
-            <p:spPr/>
-            <p:txBody>
-              <a:bodyPr/>
-              <a:lstStyle/>
-              <a:p>
-                <a:r>
-                  <a:rPr lang="en-GB" dirty="0"/>
-                  <a:t>Computation pathway of a 2layer Neural Network</a:t>
-                </a:r>
-              </a:p>
-              <a:p>
-                <a:pPr lvl="1"/>
-                <a:r>
-                  <a:rPr lang="en-GB" dirty="0"/>
-                  <a:t>1</a:t>
-                </a:r>
-                <a:r>
-                  <a:rPr lang="en-GB" baseline="30000" dirty="0"/>
-                  <a:t>st</a:t>
-                </a:r>
-                <a:r>
-                  <a:rPr lang="en-GB" dirty="0"/>
-                  <a:t> layer Input Layer</a:t>
-                </a:r>
-              </a:p>
-              <a:p>
-                <a:pPr lvl="1"/>
-                <a:r>
-                  <a:rPr lang="en-GB" dirty="0"/>
-                  <a:t>2</a:t>
-                </a:r>
-                <a:r>
-                  <a:rPr lang="en-GB" baseline="30000" dirty="0"/>
-                  <a:t>nd</a:t>
-                </a:r>
-                <a:r>
-                  <a:rPr lang="en-GB" dirty="0"/>
-                  <a:t> layer Output Layer</a:t>
-                </a:r>
-              </a:p>
-              <a:p>
-                <a:pPr lvl="1"/>
-                <a:endParaRPr lang="en-GB" dirty="0"/>
-              </a:p>
-              <a:p>
-                <a:pPr marL="457200" lvl="1" indent="0">
-                  <a:buNone/>
-                </a:pPr>
-                <a14:m>
-                  <m:oMathPara xmlns:m="http://schemas.openxmlformats.org/officeDocument/2006/math">
-                    <m:oMathParaPr>
-                      <m:jc m:val="centerGroup"/>
-                    </m:oMathParaPr>
-                    <m:oMath xmlns:m="http://schemas.openxmlformats.org/officeDocument/2006/math">
-                      <m:r>
-                        <a:rPr lang="de-CH" b="0" i="1" smtClean="0">
-                          <a:latin typeface="Cambria Math" panose="02040503050406030204" pitchFamily="18" charset="0"/>
-                          <a:ea typeface="Cambria Math" panose="02040503050406030204" pitchFamily="18" charset="0"/>
-                        </a:rPr>
-                        <m:t>𝑓</m:t>
-                      </m:r>
-                      <m:d>
-                        <m:dPr>
-                          <m:ctrlPr>
-                            <a:rPr lang="de-CH" b="0" i="1" smtClean="0">
-                              <a:latin typeface="Cambria Math" panose="02040503050406030204" pitchFamily="18" charset="0"/>
-                              <a:ea typeface="Cambria Math" panose="02040503050406030204" pitchFamily="18" charset="0"/>
-                            </a:rPr>
-                          </m:ctrlPr>
-                        </m:dPr>
-                        <m:e>
-                          <m:sSub>
-                            <m:sSubPr>
-                              <m:ctrlPr>
-                                <a:rPr lang="de-CH" b="0" i="1" smtClean="0">
-                                  <a:latin typeface="Cambria Math" panose="02040503050406030204" pitchFamily="18" charset="0"/>
-                                  <a:ea typeface="Cambria Math" panose="02040503050406030204" pitchFamily="18" charset="0"/>
-                                </a:rPr>
-                              </m:ctrlPr>
-                            </m:sSubPr>
-                            <m:e>
-                              <m:r>
-                                <a:rPr lang="de-CH" b="0" i="1" smtClean="0">
-                                  <a:latin typeface="Cambria Math" panose="02040503050406030204" pitchFamily="18" charset="0"/>
-                                  <a:ea typeface="Cambria Math" panose="02040503050406030204" pitchFamily="18" charset="0"/>
-                                </a:rPr>
-                                <m:t>𝑥</m:t>
-                              </m:r>
-                            </m:e>
-                            <m:sub>
-                              <m:r>
-                                <a:rPr lang="de-CH" b="0" i="1" smtClean="0">
-                                  <a:latin typeface="Cambria Math" panose="02040503050406030204" pitchFamily="18" charset="0"/>
-                                  <a:ea typeface="Cambria Math" panose="02040503050406030204" pitchFamily="18" charset="0"/>
-                                </a:rPr>
-                                <m:t>1</m:t>
-                              </m:r>
-                            </m:sub>
-                          </m:sSub>
-                          <m:r>
-                            <a:rPr lang="de-CH" b="0" i="1" smtClean="0">
-                              <a:latin typeface="Cambria Math" panose="02040503050406030204" pitchFamily="18" charset="0"/>
-                              <a:ea typeface="Cambria Math" panose="02040503050406030204" pitchFamily="18" charset="0"/>
-                            </a:rPr>
-                            <m:t>,</m:t>
-                          </m:r>
-                          <m:sSub>
-                            <m:sSubPr>
-                              <m:ctrlPr>
-                                <a:rPr lang="de-CH" b="0" i="1" smtClean="0">
-                                  <a:latin typeface="Cambria Math" panose="02040503050406030204" pitchFamily="18" charset="0"/>
-                                  <a:ea typeface="Cambria Math" panose="02040503050406030204" pitchFamily="18" charset="0"/>
-                                </a:rPr>
-                              </m:ctrlPr>
-                            </m:sSubPr>
-                            <m:e>
-                              <m:r>
-                                <a:rPr lang="de-CH" b="0" i="1" smtClean="0">
-                                  <a:latin typeface="Cambria Math" panose="02040503050406030204" pitchFamily="18" charset="0"/>
-                                  <a:ea typeface="Cambria Math" panose="02040503050406030204" pitchFamily="18" charset="0"/>
-                                </a:rPr>
-                                <m:t>𝑥</m:t>
-                              </m:r>
-                            </m:e>
-                            <m:sub>
-                              <m:r>
-                                <a:rPr lang="de-CH" b="0" i="1" smtClean="0">
-                                  <a:latin typeface="Cambria Math" panose="02040503050406030204" pitchFamily="18" charset="0"/>
-                                  <a:ea typeface="Cambria Math" panose="02040503050406030204" pitchFamily="18" charset="0"/>
-                                </a:rPr>
-                                <m:t>2</m:t>
-                              </m:r>
-                            </m:sub>
-                          </m:sSub>
-                        </m:e>
-                      </m:d>
-                      <m:r>
-                        <a:rPr lang="de-CH" b="0" i="1" smtClean="0">
-                          <a:latin typeface="Cambria Math" panose="02040503050406030204" pitchFamily="18" charset="0"/>
-                          <a:ea typeface="Cambria Math" panose="02040503050406030204" pitchFamily="18" charset="0"/>
-                        </a:rPr>
-                        <m:t>=</m:t>
-                      </m:r>
-                      <m:sSub>
-                        <m:sSubPr>
-                          <m:ctrlPr>
-                            <a:rPr lang="de-CH" b="0" i="1" smtClean="0">
-                              <a:latin typeface="Cambria Math" panose="02040503050406030204" pitchFamily="18" charset="0"/>
-                              <a:ea typeface="Cambria Math" panose="02040503050406030204" pitchFamily="18" charset="0"/>
-                            </a:rPr>
-                          </m:ctrlPr>
-                        </m:sSubPr>
-                        <m:e>
-                          <m:r>
-                            <a:rPr lang="de-CH" b="0" i="1" smtClean="0">
-                              <a:latin typeface="Cambria Math" panose="02040503050406030204" pitchFamily="18" charset="0"/>
-                              <a:ea typeface="Cambria Math" panose="02040503050406030204" pitchFamily="18" charset="0"/>
-                            </a:rPr>
-                            <m:t>𝑊</m:t>
-                          </m:r>
-                        </m:e>
-                        <m:sub>
-                          <m:r>
-                            <a:rPr lang="de-CH" b="0" i="1" smtClean="0">
-                              <a:latin typeface="Cambria Math" panose="02040503050406030204" pitchFamily="18" charset="0"/>
-                              <a:ea typeface="Cambria Math" panose="02040503050406030204" pitchFamily="18" charset="0"/>
-                            </a:rPr>
-                            <m:t>2</m:t>
-                          </m:r>
-                        </m:sub>
-                      </m:sSub>
-                      <m:r>
-                        <a:rPr lang="de-CH" b="0" i="1" smtClean="0">
-                          <a:latin typeface="Cambria Math" panose="02040503050406030204" pitchFamily="18" charset="0"/>
-                          <a:ea typeface="Cambria Math" panose="02040503050406030204" pitchFamily="18" charset="0"/>
-                        </a:rPr>
-                        <m:t>𝜎</m:t>
-                      </m:r>
-                      <m:d>
-                        <m:dPr>
-                          <m:ctrlPr>
-                            <a:rPr lang="de-CH" b="0" i="1" smtClean="0">
-                              <a:latin typeface="Cambria Math" panose="02040503050406030204" pitchFamily="18" charset="0"/>
-                              <a:ea typeface="Cambria Math" panose="02040503050406030204" pitchFamily="18" charset="0"/>
-                            </a:rPr>
-                          </m:ctrlPr>
-                        </m:dPr>
-                        <m:e>
-                          <m:sSub>
-                            <m:sSubPr>
-                              <m:ctrlPr>
-                                <a:rPr lang="de-CH" b="0" i="1" smtClean="0">
-                                  <a:latin typeface="Cambria Math" panose="02040503050406030204" pitchFamily="18" charset="0"/>
-                                  <a:ea typeface="Cambria Math" panose="02040503050406030204" pitchFamily="18" charset="0"/>
-                                </a:rPr>
-                              </m:ctrlPr>
-                            </m:sSubPr>
-                            <m:e>
-                              <m:r>
-                                <a:rPr lang="de-CH" b="0" i="1" smtClean="0">
-                                  <a:latin typeface="Cambria Math" panose="02040503050406030204" pitchFamily="18" charset="0"/>
-                                  <a:ea typeface="Cambria Math" panose="02040503050406030204" pitchFamily="18" charset="0"/>
-                                </a:rPr>
-                                <m:t>𝑊</m:t>
-                              </m:r>
-                            </m:e>
-                            <m:sub>
-                              <m:r>
-                                <a:rPr lang="de-CH" b="0" i="1" smtClean="0">
-                                  <a:latin typeface="Cambria Math" panose="02040503050406030204" pitchFamily="18" charset="0"/>
-                                  <a:ea typeface="Cambria Math" panose="02040503050406030204" pitchFamily="18" charset="0"/>
-                                </a:rPr>
-                                <m:t>1</m:t>
-                              </m:r>
-                            </m:sub>
-                          </m:sSub>
-                          <m:r>
-                            <a:rPr lang="de-CH" b="0" i="1" smtClean="0">
-                              <a:latin typeface="Cambria Math" panose="02040503050406030204" pitchFamily="18" charset="0"/>
-                              <a:ea typeface="Cambria Math" panose="02040503050406030204" pitchFamily="18" charset="0"/>
-                            </a:rPr>
-                            <m:t>𝑥</m:t>
-                          </m:r>
-                          <m:r>
-                            <a:rPr lang="de-CH" b="0" i="1" smtClean="0">
-                              <a:latin typeface="Cambria Math" panose="02040503050406030204" pitchFamily="18" charset="0"/>
-                              <a:ea typeface="Cambria Math" panose="02040503050406030204" pitchFamily="18" charset="0"/>
-                            </a:rPr>
-                            <m:t>+</m:t>
-                          </m:r>
-                          <m:sSub>
-                            <m:sSubPr>
-                              <m:ctrlPr>
-                                <a:rPr lang="de-CH" b="0" i="1" smtClean="0">
-                                  <a:latin typeface="Cambria Math" panose="02040503050406030204" pitchFamily="18" charset="0"/>
-                                  <a:ea typeface="Cambria Math" panose="02040503050406030204" pitchFamily="18" charset="0"/>
-                                </a:rPr>
-                              </m:ctrlPr>
-                            </m:sSubPr>
-                            <m:e>
-                              <m:r>
-                                <a:rPr lang="de-CH" b="0" i="1" smtClean="0">
-                                  <a:latin typeface="Cambria Math" panose="02040503050406030204" pitchFamily="18" charset="0"/>
-                                  <a:ea typeface="Cambria Math" panose="02040503050406030204" pitchFamily="18" charset="0"/>
-                                </a:rPr>
-                                <m:t>𝑏</m:t>
-                              </m:r>
-                            </m:e>
-                            <m:sub>
-                              <m:r>
-                                <a:rPr lang="de-CH" b="0" i="1" smtClean="0">
-                                  <a:latin typeface="Cambria Math" panose="02040503050406030204" pitchFamily="18" charset="0"/>
-                                  <a:ea typeface="Cambria Math" panose="02040503050406030204" pitchFamily="18" charset="0"/>
-                                </a:rPr>
-                                <m:t>1</m:t>
-                              </m:r>
-                            </m:sub>
-                          </m:sSub>
-                        </m:e>
-                      </m:d>
-                      <m:r>
-                        <a:rPr lang="de-CH" b="0" i="1" smtClean="0">
-                          <a:latin typeface="Cambria Math" panose="02040503050406030204" pitchFamily="18" charset="0"/>
-                          <a:ea typeface="Cambria Math" panose="02040503050406030204" pitchFamily="18" charset="0"/>
-                        </a:rPr>
-                        <m:t>+</m:t>
-                      </m:r>
-                      <m:sSub>
-                        <m:sSubPr>
-                          <m:ctrlPr>
-                            <a:rPr lang="de-CH" b="0" i="1" smtClean="0">
-                              <a:latin typeface="Cambria Math" panose="02040503050406030204" pitchFamily="18" charset="0"/>
-                              <a:ea typeface="Cambria Math" panose="02040503050406030204" pitchFamily="18" charset="0"/>
-                            </a:rPr>
-                          </m:ctrlPr>
-                        </m:sSubPr>
-                        <m:e>
-                          <m:r>
-                            <a:rPr lang="de-CH" b="0" i="1" smtClean="0">
-                              <a:latin typeface="Cambria Math" panose="02040503050406030204" pitchFamily="18" charset="0"/>
-                              <a:ea typeface="Cambria Math" panose="02040503050406030204" pitchFamily="18" charset="0"/>
-                            </a:rPr>
-                            <m:t>𝑏</m:t>
-                          </m:r>
-                        </m:e>
-                        <m:sub>
-                          <m:r>
-                            <a:rPr lang="de-CH" b="0" i="1" smtClean="0">
-                              <a:latin typeface="Cambria Math" panose="02040503050406030204" pitchFamily="18" charset="0"/>
-                              <a:ea typeface="Cambria Math" panose="02040503050406030204" pitchFamily="18" charset="0"/>
-                            </a:rPr>
-                            <m:t>2</m:t>
-                          </m:r>
-                        </m:sub>
-                      </m:sSub>
-                    </m:oMath>
-                  </m:oMathPara>
-                </a14:m>
-                <a:endParaRPr lang="de-CH" b="0" i="1" dirty="0">
-                  <a:latin typeface="Cambria Math" panose="02040503050406030204" pitchFamily="18" charset="0"/>
-                  <a:ea typeface="Cambria Math" panose="02040503050406030204" pitchFamily="18" charset="0"/>
-                </a:endParaRPr>
-              </a:p>
-              <a:p>
-                <a:pPr marL="457200" lvl="1" indent="0">
-                  <a:buNone/>
-                </a:pPr>
-                <a:endParaRPr lang="de-CH" b="0" i="1" dirty="0">
-                  <a:latin typeface="Cambria Math" panose="02040503050406030204" pitchFamily="18" charset="0"/>
-                  <a:ea typeface="Cambria Math" panose="02040503050406030204" pitchFamily="18" charset="0"/>
-                </a:endParaRPr>
-              </a:p>
-              <a:p>
-                <a:pPr marL="457200" lvl="1" indent="0">
-                  <a:buNone/>
-                </a:pPr>
-                <a14:m>
-                  <m:oMathPara xmlns:m="http://schemas.openxmlformats.org/officeDocument/2006/math">
-                    <m:oMathParaPr>
-                      <m:jc m:val="centerGroup"/>
-                    </m:oMathParaPr>
-                    <m:oMath xmlns:m="http://schemas.openxmlformats.org/officeDocument/2006/math">
-                      <m:r>
-                        <a:rPr lang="de-CH" b="0" i="1" smtClean="0">
-                          <a:latin typeface="Cambria Math" panose="02040503050406030204" pitchFamily="18" charset="0"/>
-                          <a:ea typeface="Cambria Math" panose="02040503050406030204" pitchFamily="18" charset="0"/>
-                        </a:rPr>
-                        <m:t>ℒ</m:t>
-                      </m:r>
-                      <m:d>
-                        <m:dPr>
-                          <m:ctrlPr>
-                            <a:rPr lang="de-CH" b="0" i="1" smtClean="0">
-                              <a:latin typeface="Cambria Math" panose="02040503050406030204" pitchFamily="18" charset="0"/>
-                              <a:ea typeface="Cambria Math" panose="02040503050406030204" pitchFamily="18" charset="0"/>
-                            </a:rPr>
-                          </m:ctrlPr>
-                        </m:dPr>
-                        <m:e>
-                          <m:r>
-                            <a:rPr lang="de-CH" b="0" i="1" smtClean="0">
-                              <a:latin typeface="Cambria Math" panose="02040503050406030204" pitchFamily="18" charset="0"/>
-                              <a:ea typeface="Cambria Math" panose="02040503050406030204" pitchFamily="18" charset="0"/>
-                            </a:rPr>
-                            <m:t>𝜃</m:t>
-                          </m:r>
-                        </m:e>
-                      </m:d>
-                      <m:r>
-                        <a:rPr lang="de-CH" b="0" i="1" smtClean="0">
-                          <a:latin typeface="Cambria Math" panose="02040503050406030204" pitchFamily="18" charset="0"/>
-                          <a:ea typeface="Cambria Math" panose="02040503050406030204" pitchFamily="18" charset="0"/>
-                        </a:rPr>
-                        <m:t>=</m:t>
-                      </m:r>
-                      <m:sSup>
-                        <m:sSupPr>
-                          <m:ctrlPr>
-                            <a:rPr lang="de-CH" b="0" i="1" smtClean="0">
-                              <a:latin typeface="Cambria Math" panose="02040503050406030204" pitchFamily="18" charset="0"/>
-                              <a:ea typeface="Cambria Math" panose="02040503050406030204" pitchFamily="18" charset="0"/>
-                            </a:rPr>
-                          </m:ctrlPr>
-                        </m:sSupPr>
-                        <m:e>
-                          <m:d>
-                            <m:dPr>
-                              <m:ctrlPr>
-                                <a:rPr lang="de-CH" b="0" i="1" smtClean="0">
-                                  <a:latin typeface="Cambria Math" panose="02040503050406030204" pitchFamily="18" charset="0"/>
-                                  <a:ea typeface="Cambria Math" panose="02040503050406030204" pitchFamily="18" charset="0"/>
-                                </a:rPr>
-                              </m:ctrlPr>
-                            </m:dPr>
-                            <m:e>
-                              <m:sSub>
-                                <m:sSubPr>
-                                  <m:ctrlPr>
-                                    <a:rPr lang="de-CH" b="0" i="1" smtClean="0">
-                                      <a:latin typeface="Cambria Math" panose="02040503050406030204" pitchFamily="18" charset="0"/>
-                                      <a:ea typeface="Cambria Math" panose="02040503050406030204" pitchFamily="18" charset="0"/>
-                                    </a:rPr>
-                                  </m:ctrlPr>
-                                </m:sSubPr>
-                                <m:e>
-                                  <m:r>
-                                    <a:rPr lang="de-CH" b="0" i="1" smtClean="0">
-                                      <a:latin typeface="Cambria Math" panose="02040503050406030204" pitchFamily="18" charset="0"/>
-                                      <a:ea typeface="Cambria Math" panose="02040503050406030204" pitchFamily="18" charset="0"/>
-                                    </a:rPr>
-                                    <m:t>𝑓</m:t>
-                                  </m:r>
-                                </m:e>
-                                <m:sub>
-                                  <m:r>
-                                    <a:rPr lang="de-CH" b="0" i="1" smtClean="0">
-                                      <a:latin typeface="Cambria Math" panose="02040503050406030204" pitchFamily="18" charset="0"/>
-                                      <a:ea typeface="Cambria Math" panose="02040503050406030204" pitchFamily="18" charset="0"/>
-                                    </a:rPr>
-                                    <m:t>𝜃</m:t>
-                                  </m:r>
-                                </m:sub>
-                              </m:sSub>
-                              <m:d>
-                                <m:dPr>
-                                  <m:ctrlPr>
-                                    <a:rPr lang="de-CH" b="0" i="1" smtClean="0">
-                                      <a:latin typeface="Cambria Math" panose="02040503050406030204" pitchFamily="18" charset="0"/>
-                                      <a:ea typeface="Cambria Math" panose="02040503050406030204" pitchFamily="18" charset="0"/>
-                                    </a:rPr>
-                                  </m:ctrlPr>
-                                </m:dPr>
-                                <m:e>
-                                  <m:sSub>
-                                    <m:sSubPr>
-                                      <m:ctrlPr>
-                                        <a:rPr lang="de-CH" b="0" i="1" smtClean="0">
-                                          <a:latin typeface="Cambria Math" panose="02040503050406030204" pitchFamily="18" charset="0"/>
-                                          <a:ea typeface="Cambria Math" panose="02040503050406030204" pitchFamily="18" charset="0"/>
-                                        </a:rPr>
-                                      </m:ctrlPr>
-                                    </m:sSubPr>
-                                    <m:e>
-                                      <m:r>
-                                        <a:rPr lang="de-CH" b="0" i="1" smtClean="0">
-                                          <a:latin typeface="Cambria Math" panose="02040503050406030204" pitchFamily="18" charset="0"/>
-                                          <a:ea typeface="Cambria Math" panose="02040503050406030204" pitchFamily="18" charset="0"/>
-                                        </a:rPr>
-                                        <m:t>𝑥</m:t>
-                                      </m:r>
-                                    </m:e>
-                                    <m:sub>
-                                      <m:r>
-                                        <a:rPr lang="de-CH" b="0" i="1" smtClean="0">
-                                          <a:latin typeface="Cambria Math" panose="02040503050406030204" pitchFamily="18" charset="0"/>
-                                          <a:ea typeface="Cambria Math" panose="02040503050406030204" pitchFamily="18" charset="0"/>
-                                        </a:rPr>
-                                        <m:t>1</m:t>
-                                      </m:r>
-                                    </m:sub>
-                                  </m:sSub>
-                                  <m:r>
-                                    <a:rPr lang="de-CH" b="0" i="1" smtClean="0">
-                                      <a:latin typeface="Cambria Math" panose="02040503050406030204" pitchFamily="18" charset="0"/>
-                                      <a:ea typeface="Cambria Math" panose="02040503050406030204" pitchFamily="18" charset="0"/>
-                                    </a:rPr>
-                                    <m:t>,</m:t>
-                                  </m:r>
-                                  <m:sSub>
-                                    <m:sSubPr>
-                                      <m:ctrlPr>
-                                        <a:rPr lang="de-CH" b="0" i="1" smtClean="0">
-                                          <a:latin typeface="Cambria Math" panose="02040503050406030204" pitchFamily="18" charset="0"/>
-                                          <a:ea typeface="Cambria Math" panose="02040503050406030204" pitchFamily="18" charset="0"/>
-                                        </a:rPr>
-                                      </m:ctrlPr>
-                                    </m:sSubPr>
-                                    <m:e>
-                                      <m:r>
-                                        <a:rPr lang="de-CH" b="0" i="1" smtClean="0">
-                                          <a:latin typeface="Cambria Math" panose="02040503050406030204" pitchFamily="18" charset="0"/>
-                                          <a:ea typeface="Cambria Math" panose="02040503050406030204" pitchFamily="18" charset="0"/>
-                                        </a:rPr>
-                                        <m:t>𝑥</m:t>
-                                      </m:r>
-                                    </m:e>
-                                    <m:sub>
-                                      <m:r>
-                                        <a:rPr lang="de-CH" b="0" i="1" smtClean="0">
-                                          <a:latin typeface="Cambria Math" panose="02040503050406030204" pitchFamily="18" charset="0"/>
-                                          <a:ea typeface="Cambria Math" panose="02040503050406030204" pitchFamily="18" charset="0"/>
-                                        </a:rPr>
-                                        <m:t>2</m:t>
-                                      </m:r>
-                                    </m:sub>
-                                  </m:sSub>
-                                </m:e>
-                              </m:d>
-                              <m:r>
-                                <a:rPr lang="de-CH" b="0" i="1" smtClean="0">
-                                  <a:latin typeface="Cambria Math" panose="02040503050406030204" pitchFamily="18" charset="0"/>
-                                  <a:ea typeface="Cambria Math" panose="02040503050406030204" pitchFamily="18" charset="0"/>
-                                </a:rPr>
-                                <m:t>−</m:t>
-                              </m:r>
-                              <m:r>
-                                <a:rPr lang="de-CH" b="0" i="1" smtClean="0">
-                                  <a:latin typeface="Cambria Math" panose="02040503050406030204" pitchFamily="18" charset="0"/>
-                                  <a:ea typeface="Cambria Math" panose="02040503050406030204" pitchFamily="18" charset="0"/>
-                                </a:rPr>
-                                <m:t>𝑦</m:t>
-                              </m:r>
-                            </m:e>
-                          </m:d>
-                        </m:e>
-                        <m:sup>
-                          <m:r>
-                            <a:rPr lang="de-CH" b="0" i="1" smtClean="0">
-                              <a:latin typeface="Cambria Math" panose="02040503050406030204" pitchFamily="18" charset="0"/>
-                              <a:ea typeface="Cambria Math" panose="02040503050406030204" pitchFamily="18" charset="0"/>
-                            </a:rPr>
-                            <m:t>2</m:t>
-                          </m:r>
-                        </m:sup>
-                      </m:sSup>
-                      <m:r>
-                        <a:rPr lang="de-CH" b="0" i="1" smtClean="0">
-                          <a:latin typeface="Cambria Math" panose="02040503050406030204" pitchFamily="18" charset="0"/>
-                          <a:ea typeface="Cambria Math" panose="02040503050406030204" pitchFamily="18" charset="0"/>
-                        </a:rPr>
-                        <m:t> </m:t>
-                      </m:r>
-                    </m:oMath>
-                  </m:oMathPara>
-                </a14:m>
-                <a:endParaRPr lang="de-CH" b="0" dirty="0">
-                  <a:ea typeface="Cambria Math" panose="02040503050406030204" pitchFamily="18" charset="0"/>
-                </a:endParaRPr>
-              </a:p>
-              <a:p>
-                <a:pPr marL="457200" lvl="1" indent="0">
-                  <a:buNone/>
-                </a:pPr>
-                <a:endParaRPr lang="en-GB" dirty="0"/>
-              </a:p>
-            </p:txBody>
-          </p:sp>
-        </mc:Choice>
-        <mc:Fallback>
-          <p:sp>
-            <p:nvSpPr>
-              <p:cNvPr id="3" name="Inhaltsplatzhalter 2">
-                <a:extLst>
-                  <a:ext uri="{FF2B5EF4-FFF2-40B4-BE49-F238E27FC236}">
-                    <a16:creationId xmlns:a16="http://schemas.microsoft.com/office/drawing/2014/main" id="{CD895501-1B38-DC8B-0174-ADBB447E9B7F}"/>
-                  </a:ext>
-                </a:extLst>
-              </p:cNvPr>
-              <p:cNvSpPr>
-                <a:spLocks noGrp="1" noRot="1" noChangeAspect="1" noMove="1" noResize="1" noEditPoints="1" noAdjustHandles="1" noChangeArrowheads="1" noChangeShapeType="1" noTextEdit="1"/>
-              </p:cNvSpPr>
-              <p:nvPr>
-                <p:ph idx="1"/>
-              </p:nvPr>
-            </p:nvSpPr>
-            <p:spPr>
-              <a:blipFill>
-                <a:blip r:embed="rId2"/>
-                <a:stretch>
-                  <a:fillRect l="-1043" t="-2381"/>
-                </a:stretch>
-              </a:blipFill>
-            </p:spPr>
-            <p:txBody>
-              <a:bodyPr/>
-              <a:lstStyle/>
-              <a:p>
-                <a:r>
-                  <a:rPr lang="en-GB">
-                    <a:noFill/>
-                  </a:rPr>
-                  <a:t> </a:t>
-                </a:r>
-              </a:p>
-            </p:txBody>
-          </p:sp>
-        </mc:Fallback>
-      </mc:AlternateContent>
-      <p:pic>
-        <p:nvPicPr>
-          <p:cNvPr id="4" name="Inhaltsplatzhalter 3">
-            <a:extLst>
-              <a:ext uri="{FF2B5EF4-FFF2-40B4-BE49-F238E27FC236}">
-                <a16:creationId xmlns:a16="http://schemas.microsoft.com/office/drawing/2014/main" id="{53AE2F29-675A-2620-9D1D-8B03038E9621}"/>
-              </a:ext>
-            </a:extLst>
-          </p:cNvPr>
-          <p:cNvPicPr>
-            <a:picLocks noChangeAspect="1"/>
-          </p:cNvPicPr>
-          <p:nvPr/>
-        </p:nvPicPr>
-        <p:blipFill>
-          <a:blip r:embed="rId3"/>
-          <a:srcRect l="35454" t="13017" r="3127" b="39743"/>
-          <a:stretch>
-            <a:fillRect/>
-          </a:stretch>
-        </p:blipFill>
-        <p:spPr>
-          <a:xfrm>
-            <a:off x="7593904" y="3859565"/>
-            <a:ext cx="4250130" cy="2452335"/>
-          </a:xfrm>
-          <a:prstGeom prst="rect">
-            <a:avLst/>
-          </a:prstGeom>
-        </p:spPr>
-      </p:pic>
-    </p:spTree>
-    <p:extLst>
-      <p:ext uri="{BB962C8B-B14F-4D97-AF65-F5344CB8AC3E}">
-        <p14:creationId xmlns:p14="http://schemas.microsoft.com/office/powerpoint/2010/main" val="2267159458"/>
-      </p:ext>
-    </p:extLst>
-  </p:cSld>
-  <p:clrMapOvr>
-    <a:masterClrMapping/>
-  </p:clrMapOvr>
-</p:sld>
-</file>
-
-<file path=ppt/slides/slide7.xml><?xml version="1.0" encoding="utf-8"?>
-<p:sld xmlns:a="http://schemas.openxmlformats.org/drawingml/2006/main" xmlns:r="http://schemas.openxmlformats.org/officeDocument/2006/relationships" xmlns:p="http://schemas.openxmlformats.org/presentationml/2006/main">
-  <p:cSld>
-    <p:spTree>
-      <p:nvGrpSpPr>
-        <p:cNvPr id="1" name="">
-          <a:extLst>
-            <a:ext uri="{FF2B5EF4-FFF2-40B4-BE49-F238E27FC236}">
-              <a16:creationId xmlns:a16="http://schemas.microsoft.com/office/drawing/2014/main" id="{D0A59DCD-CABD-1FEE-0AFD-0B87D792B962}"/>
-            </a:ext>
-          </a:extLst>
-        </p:cNvPr>
-        <p:cNvGrpSpPr/>
-        <p:nvPr/>
-      </p:nvGrpSpPr>
-      <p:grpSpPr>
-        <a:xfrm>
-          <a:off x="0" y="0"/>
-          <a:ext cx="0" cy="0"/>
-          <a:chOff x="0" y="0"/>
-          <a:chExt cx="0" cy="0"/>
-        </a:xfrm>
-      </p:grpSpPr>
-      <p:sp>
-        <p:nvSpPr>
-          <p:cNvPr id="2" name="Titel 1">
-            <a:extLst>
-              <a:ext uri="{FF2B5EF4-FFF2-40B4-BE49-F238E27FC236}">
-                <a16:creationId xmlns:a16="http://schemas.microsoft.com/office/drawing/2014/main" id="{FD5F0E0C-5273-F5B4-ECF6-A256A6655B2C}"/>
-              </a:ext>
-            </a:extLst>
-          </p:cNvPr>
-          <p:cNvSpPr>
-            <a:spLocks noGrp="1"/>
-          </p:cNvSpPr>
-          <p:nvPr>
-            <p:ph type="title"/>
-          </p:nvPr>
-        </p:nvSpPr>
-        <p:spPr/>
-        <p:txBody>
-          <a:bodyPr/>
-          <a:lstStyle/>
-          <a:p>
-            <a:r>
-              <a:rPr lang="en-GB" dirty="0"/>
-              <a:t>Autoencoder</a:t>
-            </a:r>
-          </a:p>
-        </p:txBody>
-      </p:sp>
-      <mc:AlternateContent xmlns:mc="http://schemas.openxmlformats.org/markup-compatibility/2006">
-        <mc:Choice xmlns:a14="http://schemas.microsoft.com/office/drawing/2010/main" Requires="a14">
-          <p:sp>
-            <p:nvSpPr>
-              <p:cNvPr id="3" name="Inhaltsplatzhalter 2">
-                <a:extLst>
-                  <a:ext uri="{FF2B5EF4-FFF2-40B4-BE49-F238E27FC236}">
-                    <a16:creationId xmlns:a16="http://schemas.microsoft.com/office/drawing/2014/main" id="{7AD3E912-5097-5BA8-38E2-6D2320FCF5AB}"/>
-                  </a:ext>
-                </a:extLst>
-              </p:cNvPr>
-              <p:cNvSpPr>
-                <a:spLocks noGrp="1"/>
-              </p:cNvSpPr>
-              <p:nvPr>
-                <p:ph idx="1"/>
-              </p:nvPr>
-            </p:nvSpPr>
-            <p:spPr/>
-            <p:txBody>
-              <a:bodyPr/>
-              <a:lstStyle/>
-              <a:p>
-                <a:r>
-                  <a:rPr lang="en-GB" dirty="0"/>
-                  <a:t>Computation pathway of a 2layer Neural Network</a:t>
-                </a:r>
-              </a:p>
-              <a:p>
-                <a:pPr lvl="1"/>
-                <a:r>
-                  <a:rPr lang="en-GB" dirty="0"/>
-                  <a:t>1</a:t>
-                </a:r>
-                <a:r>
-                  <a:rPr lang="en-GB" baseline="30000" dirty="0"/>
-                  <a:t>st</a:t>
-                </a:r>
-                <a:r>
-                  <a:rPr lang="en-GB" dirty="0"/>
-                  <a:t> layer Input Layer</a:t>
-                </a:r>
-              </a:p>
-              <a:p>
-                <a:pPr lvl="1"/>
-                <a:r>
-                  <a:rPr lang="en-GB" dirty="0"/>
-                  <a:t>2</a:t>
-                </a:r>
-                <a:r>
-                  <a:rPr lang="en-GB" baseline="30000" dirty="0"/>
-                  <a:t>nd</a:t>
-                </a:r>
-                <a:r>
-                  <a:rPr lang="en-GB" dirty="0"/>
-                  <a:t> layer latent Layer</a:t>
-                </a:r>
-              </a:p>
-              <a:p>
-                <a:pPr lvl="1"/>
-                <a:r>
-                  <a:rPr lang="en-GB" dirty="0"/>
-                  <a:t>3</a:t>
-                </a:r>
-                <a:r>
-                  <a:rPr lang="en-GB" baseline="30000" dirty="0"/>
-                  <a:t>rd</a:t>
-                </a:r>
-                <a:r>
-                  <a:rPr lang="en-GB" dirty="0"/>
-                  <a:t>  layer latent Layer</a:t>
-                </a:r>
-              </a:p>
-              <a:p>
-                <a:pPr lvl="1"/>
-                <a:r>
-                  <a:rPr lang="en-GB" dirty="0"/>
-                  <a:t>4th layer </a:t>
-                </a:r>
-                <a:r>
-                  <a:rPr lang="en-GB" dirty="0" err="1"/>
-                  <a:t>Ouput</a:t>
-                </a:r>
-                <a:r>
-                  <a:rPr lang="en-GB" dirty="0"/>
-                  <a:t> Layer</a:t>
-                </a:r>
-              </a:p>
-              <a:p>
-                <a:pPr lvl="1"/>
-                <a:endParaRPr lang="en-GB" dirty="0"/>
-              </a:p>
-              <a:p>
-                <a:pPr lvl="1"/>
-                <a:endParaRPr lang="en-GB" dirty="0"/>
-              </a:p>
-              <a:p>
-                <a:pPr lvl="1"/>
-                <a:endParaRPr lang="en-GB" dirty="0"/>
-              </a:p>
-              <a:p>
-                <a:pPr marL="457200" lvl="1" indent="0">
-                  <a:buNone/>
-                </a:pPr>
-                <a14:m>
-                  <m:oMathPara xmlns:m="http://schemas.openxmlformats.org/officeDocument/2006/math">
-                    <m:oMathParaPr>
-                      <m:jc m:val="centerGroup"/>
-                    </m:oMathParaPr>
-                    <m:oMath xmlns:m="http://schemas.openxmlformats.org/officeDocument/2006/math">
-                      <m:r>
-                        <a:rPr lang="de-CH" b="0" i="1" smtClean="0">
-                          <a:latin typeface="Cambria Math" panose="02040503050406030204" pitchFamily="18" charset="0"/>
-                          <a:ea typeface="Cambria Math" panose="02040503050406030204" pitchFamily="18" charset="0"/>
-                        </a:rPr>
-                        <m:t>𝑓</m:t>
-                      </m:r>
-                      <m:d>
-                        <m:dPr>
-                          <m:ctrlPr>
-                            <a:rPr lang="de-CH" b="0" i="1" smtClean="0">
-                              <a:latin typeface="Cambria Math" panose="02040503050406030204" pitchFamily="18" charset="0"/>
-                              <a:ea typeface="Cambria Math" panose="02040503050406030204" pitchFamily="18" charset="0"/>
-                            </a:rPr>
-                          </m:ctrlPr>
-                        </m:dPr>
-                        <m:e>
-                          <m:sSub>
-                            <m:sSubPr>
-                              <m:ctrlPr>
-                                <a:rPr lang="de-CH" b="0" i="1" smtClean="0">
-                                  <a:latin typeface="Cambria Math" panose="02040503050406030204" pitchFamily="18" charset="0"/>
-                                  <a:ea typeface="Cambria Math" panose="02040503050406030204" pitchFamily="18" charset="0"/>
-                                </a:rPr>
-                              </m:ctrlPr>
-                            </m:sSubPr>
-                            <m:e>
-                              <m:r>
-                                <a:rPr lang="de-CH" b="0" i="1" smtClean="0">
-                                  <a:latin typeface="Cambria Math" panose="02040503050406030204" pitchFamily="18" charset="0"/>
-                                  <a:ea typeface="Cambria Math" panose="02040503050406030204" pitchFamily="18" charset="0"/>
-                                </a:rPr>
-                                <m:t>𝑥</m:t>
-                              </m:r>
-                            </m:e>
-                            <m:sub>
-                              <m:r>
-                                <a:rPr lang="de-CH" b="0" i="1" smtClean="0">
-                                  <a:latin typeface="Cambria Math" panose="02040503050406030204" pitchFamily="18" charset="0"/>
-                                  <a:ea typeface="Cambria Math" panose="02040503050406030204" pitchFamily="18" charset="0"/>
-                                </a:rPr>
-                                <m:t>1</m:t>
-                              </m:r>
-                            </m:sub>
-                          </m:sSub>
-                          <m:r>
-                            <a:rPr lang="de-CH" b="0" i="1" smtClean="0">
-                              <a:latin typeface="Cambria Math" panose="02040503050406030204" pitchFamily="18" charset="0"/>
-                              <a:ea typeface="Cambria Math" panose="02040503050406030204" pitchFamily="18" charset="0"/>
-                            </a:rPr>
-                            <m:t>,</m:t>
-                          </m:r>
-                          <m:sSub>
-                            <m:sSubPr>
-                              <m:ctrlPr>
-                                <a:rPr lang="de-CH" b="0" i="1" smtClean="0">
-                                  <a:latin typeface="Cambria Math" panose="02040503050406030204" pitchFamily="18" charset="0"/>
-                                  <a:ea typeface="Cambria Math" panose="02040503050406030204" pitchFamily="18" charset="0"/>
-                                </a:rPr>
-                              </m:ctrlPr>
-                            </m:sSubPr>
-                            <m:e>
-                              <m:r>
-                                <a:rPr lang="de-CH" b="0" i="1" smtClean="0">
-                                  <a:latin typeface="Cambria Math" panose="02040503050406030204" pitchFamily="18" charset="0"/>
-                                  <a:ea typeface="Cambria Math" panose="02040503050406030204" pitchFamily="18" charset="0"/>
-                                </a:rPr>
-                                <m:t>𝑥</m:t>
-                              </m:r>
-                            </m:e>
-                            <m:sub>
-                              <m:r>
-                                <a:rPr lang="de-CH" b="0" i="1" smtClean="0">
-                                  <a:latin typeface="Cambria Math" panose="02040503050406030204" pitchFamily="18" charset="0"/>
-                                  <a:ea typeface="Cambria Math" panose="02040503050406030204" pitchFamily="18" charset="0"/>
-                                </a:rPr>
-                                <m:t>2</m:t>
-                              </m:r>
-                            </m:sub>
-                          </m:sSub>
-                        </m:e>
-                      </m:d>
-                      <m:r>
-                        <a:rPr lang="de-CH" b="0" i="1" smtClean="0">
-                          <a:latin typeface="Cambria Math" panose="02040503050406030204" pitchFamily="18" charset="0"/>
-                          <a:ea typeface="Cambria Math" panose="02040503050406030204" pitchFamily="18" charset="0"/>
-                        </a:rPr>
-                        <m:t>=</m:t>
-                      </m:r>
-                      <m:sSub>
-                        <m:sSubPr>
-                          <m:ctrlPr>
-                            <a:rPr lang="de-CH" b="0" i="1" smtClean="0">
-                              <a:latin typeface="Cambria Math" panose="02040503050406030204" pitchFamily="18" charset="0"/>
-                              <a:ea typeface="Cambria Math" panose="02040503050406030204" pitchFamily="18" charset="0"/>
-                            </a:rPr>
-                          </m:ctrlPr>
-                        </m:sSubPr>
-                        <m:e>
-                          <m:sSub>
-                            <m:sSubPr>
-                              <m:ctrlPr>
-                                <a:rPr lang="de-CH" b="0" i="1" smtClean="0">
-                                  <a:latin typeface="Cambria Math" panose="02040503050406030204" pitchFamily="18" charset="0"/>
-                                  <a:ea typeface="Cambria Math" panose="02040503050406030204" pitchFamily="18" charset="0"/>
-                                </a:rPr>
-                              </m:ctrlPr>
-                            </m:sSubPr>
-                            <m:e>
-                              <m:sSub>
-                                <m:sSubPr>
-                                  <m:ctrlPr>
-                                    <a:rPr lang="de-CH" b="0" i="1" smtClean="0">
-                                      <a:latin typeface="Cambria Math" panose="02040503050406030204" pitchFamily="18" charset="0"/>
-                                      <a:ea typeface="Cambria Math" panose="02040503050406030204" pitchFamily="18" charset="0"/>
-                                    </a:rPr>
-                                  </m:ctrlPr>
-                                </m:sSubPr>
-                                <m:e>
-                                  <m:r>
-                                    <a:rPr lang="de-CH" b="0" i="1" smtClean="0">
-                                      <a:latin typeface="Cambria Math" panose="02040503050406030204" pitchFamily="18" charset="0"/>
-                                      <a:ea typeface="Cambria Math" panose="02040503050406030204" pitchFamily="18" charset="0"/>
-                                    </a:rPr>
-                                    <m:t>𝑊</m:t>
-                                  </m:r>
-                                </m:e>
-                                <m:sub>
-                                  <m:r>
-                                    <a:rPr lang="de-CH" b="0" i="1" smtClean="0">
-                                      <a:latin typeface="Cambria Math" panose="02040503050406030204" pitchFamily="18" charset="0"/>
-                                      <a:ea typeface="Cambria Math" panose="02040503050406030204" pitchFamily="18" charset="0"/>
-                                    </a:rPr>
-                                    <m:t>4</m:t>
-                                  </m:r>
-                                </m:sub>
-                              </m:sSub>
-                              <m:r>
-                                <a:rPr lang="de-CH" b="0" i="1" smtClean="0">
-                                  <a:latin typeface="Cambria Math" panose="02040503050406030204" pitchFamily="18" charset="0"/>
-                                  <a:ea typeface="Cambria Math" panose="02040503050406030204" pitchFamily="18" charset="0"/>
-                                </a:rPr>
-                                <m:t>𝜎</m:t>
-                              </m:r>
-                              <m:r>
-                                <a:rPr lang="de-CH" b="0" i="1" smtClean="0">
-                                  <a:latin typeface="Cambria Math" panose="02040503050406030204" pitchFamily="18" charset="0"/>
-                                  <a:ea typeface="Cambria Math" panose="02040503050406030204" pitchFamily="18" charset="0"/>
-                                </a:rPr>
-                                <m:t>(</m:t>
-                              </m:r>
-                              <m:r>
-                                <a:rPr lang="de-CH" b="0" i="1" smtClean="0">
-                                  <a:latin typeface="Cambria Math" panose="02040503050406030204" pitchFamily="18" charset="0"/>
-                                  <a:ea typeface="Cambria Math" panose="02040503050406030204" pitchFamily="18" charset="0"/>
-                                </a:rPr>
-                                <m:t>𝑊</m:t>
-                              </m:r>
-                            </m:e>
-                            <m:sub>
-                              <m:r>
-                                <a:rPr lang="de-CH" b="0" i="1" smtClean="0">
-                                  <a:latin typeface="Cambria Math" panose="02040503050406030204" pitchFamily="18" charset="0"/>
-                                  <a:ea typeface="Cambria Math" panose="02040503050406030204" pitchFamily="18" charset="0"/>
-                                </a:rPr>
-                                <m:t>3</m:t>
-                              </m:r>
-                            </m:sub>
-                          </m:sSub>
-                          <m:r>
-                            <a:rPr lang="de-CH" i="1">
-                              <a:latin typeface="Cambria Math" panose="02040503050406030204" pitchFamily="18" charset="0"/>
-                              <a:ea typeface="Cambria Math" panose="02040503050406030204" pitchFamily="18" charset="0"/>
-                            </a:rPr>
-                            <m:t>𝜎</m:t>
-                          </m:r>
-                          <m:r>
-                            <a:rPr lang="de-CH" b="0" i="1" smtClean="0">
-                              <a:latin typeface="Cambria Math" panose="02040503050406030204" pitchFamily="18" charset="0"/>
-                              <a:ea typeface="Cambria Math" panose="02040503050406030204" pitchFamily="18" charset="0"/>
-                            </a:rPr>
-                            <m:t>(</m:t>
-                          </m:r>
-                          <m:r>
-                            <a:rPr lang="de-CH" b="0" i="1" smtClean="0">
-                              <a:latin typeface="Cambria Math" panose="02040503050406030204" pitchFamily="18" charset="0"/>
-                              <a:ea typeface="Cambria Math" panose="02040503050406030204" pitchFamily="18" charset="0"/>
-                            </a:rPr>
-                            <m:t>𝑊</m:t>
-                          </m:r>
-                        </m:e>
-                        <m:sub>
-                          <m:r>
-                            <a:rPr lang="de-CH" b="0" i="1" smtClean="0">
-                              <a:latin typeface="Cambria Math" panose="02040503050406030204" pitchFamily="18" charset="0"/>
-                              <a:ea typeface="Cambria Math" panose="02040503050406030204" pitchFamily="18" charset="0"/>
-                            </a:rPr>
-                            <m:t>2</m:t>
-                          </m:r>
-                        </m:sub>
-                      </m:sSub>
-                      <m:r>
-                        <a:rPr lang="de-CH" b="0" i="1" smtClean="0">
-                          <a:latin typeface="Cambria Math" panose="02040503050406030204" pitchFamily="18" charset="0"/>
-                          <a:ea typeface="Cambria Math" panose="02040503050406030204" pitchFamily="18" charset="0"/>
-                        </a:rPr>
-                        <m:t>𝜎</m:t>
-                      </m:r>
-                      <m:d>
-                        <m:dPr>
-                          <m:ctrlPr>
-                            <a:rPr lang="de-CH" b="0" i="1" smtClean="0">
-                              <a:latin typeface="Cambria Math" panose="02040503050406030204" pitchFamily="18" charset="0"/>
-                              <a:ea typeface="Cambria Math" panose="02040503050406030204" pitchFamily="18" charset="0"/>
-                            </a:rPr>
-                          </m:ctrlPr>
-                        </m:dPr>
-                        <m:e>
-                          <m:sSub>
-                            <m:sSubPr>
-                              <m:ctrlPr>
-                                <a:rPr lang="de-CH" b="0" i="1" smtClean="0">
-                                  <a:latin typeface="Cambria Math" panose="02040503050406030204" pitchFamily="18" charset="0"/>
-                                  <a:ea typeface="Cambria Math" panose="02040503050406030204" pitchFamily="18" charset="0"/>
-                                </a:rPr>
-                              </m:ctrlPr>
-                            </m:sSubPr>
-                            <m:e>
-                              <m:r>
-                                <a:rPr lang="de-CH" b="0" i="1" smtClean="0">
-                                  <a:latin typeface="Cambria Math" panose="02040503050406030204" pitchFamily="18" charset="0"/>
-                                  <a:ea typeface="Cambria Math" panose="02040503050406030204" pitchFamily="18" charset="0"/>
-                                </a:rPr>
-                                <m:t>𝑊</m:t>
-                              </m:r>
-                            </m:e>
-                            <m:sub>
-                              <m:r>
-                                <a:rPr lang="de-CH" b="0" i="1" smtClean="0">
-                                  <a:latin typeface="Cambria Math" panose="02040503050406030204" pitchFamily="18" charset="0"/>
-                                  <a:ea typeface="Cambria Math" panose="02040503050406030204" pitchFamily="18" charset="0"/>
-                                </a:rPr>
-                                <m:t>1</m:t>
-                              </m:r>
-                            </m:sub>
-                          </m:sSub>
-                          <m:r>
-                            <a:rPr lang="de-CH" b="0" i="1" smtClean="0">
-                              <a:latin typeface="Cambria Math" panose="02040503050406030204" pitchFamily="18" charset="0"/>
-                              <a:ea typeface="Cambria Math" panose="02040503050406030204" pitchFamily="18" charset="0"/>
-                            </a:rPr>
-                            <m:t>𝑥</m:t>
-                          </m:r>
-                          <m:r>
-                            <a:rPr lang="de-CH" b="0" i="1" smtClean="0">
-                              <a:latin typeface="Cambria Math" panose="02040503050406030204" pitchFamily="18" charset="0"/>
-                              <a:ea typeface="Cambria Math" panose="02040503050406030204" pitchFamily="18" charset="0"/>
-                            </a:rPr>
-                            <m:t>+</m:t>
-                          </m:r>
-                          <m:sSub>
-                            <m:sSubPr>
-                              <m:ctrlPr>
-                                <a:rPr lang="de-CH" b="0" i="1" smtClean="0">
-                                  <a:latin typeface="Cambria Math" panose="02040503050406030204" pitchFamily="18" charset="0"/>
-                                  <a:ea typeface="Cambria Math" panose="02040503050406030204" pitchFamily="18" charset="0"/>
-                                </a:rPr>
-                              </m:ctrlPr>
-                            </m:sSubPr>
-                            <m:e>
-                              <m:r>
-                                <a:rPr lang="de-CH" b="0" i="1" smtClean="0">
-                                  <a:latin typeface="Cambria Math" panose="02040503050406030204" pitchFamily="18" charset="0"/>
-                                  <a:ea typeface="Cambria Math" panose="02040503050406030204" pitchFamily="18" charset="0"/>
-                                </a:rPr>
-                                <m:t>𝑏</m:t>
-                              </m:r>
-                            </m:e>
-                            <m:sub>
-                              <m:r>
-                                <a:rPr lang="de-CH" b="0" i="1" smtClean="0">
-                                  <a:latin typeface="Cambria Math" panose="02040503050406030204" pitchFamily="18" charset="0"/>
-                                  <a:ea typeface="Cambria Math" panose="02040503050406030204" pitchFamily="18" charset="0"/>
-                                </a:rPr>
-                                <m:t>1</m:t>
-                              </m:r>
-                            </m:sub>
-                          </m:sSub>
-                        </m:e>
-                      </m:d>
-                      <m:r>
-                        <a:rPr lang="de-CH" b="0" i="1" smtClean="0">
-                          <a:latin typeface="Cambria Math" panose="02040503050406030204" pitchFamily="18" charset="0"/>
-                          <a:ea typeface="Cambria Math" panose="02040503050406030204" pitchFamily="18" charset="0"/>
-                        </a:rPr>
-                        <m:t>+</m:t>
-                      </m:r>
-                      <m:sSub>
-                        <m:sSubPr>
-                          <m:ctrlPr>
-                            <a:rPr lang="de-CH" b="0" i="1" smtClean="0">
-                              <a:latin typeface="Cambria Math" panose="02040503050406030204" pitchFamily="18" charset="0"/>
-                              <a:ea typeface="Cambria Math" panose="02040503050406030204" pitchFamily="18" charset="0"/>
-                            </a:rPr>
-                          </m:ctrlPr>
-                        </m:sSubPr>
-                        <m:e>
-                          <m:r>
-                            <a:rPr lang="de-CH" b="0" i="1" smtClean="0">
-                              <a:latin typeface="Cambria Math" panose="02040503050406030204" pitchFamily="18" charset="0"/>
-                              <a:ea typeface="Cambria Math" panose="02040503050406030204" pitchFamily="18" charset="0"/>
-                            </a:rPr>
-                            <m:t>𝑏</m:t>
-                          </m:r>
-                        </m:e>
-                        <m:sub>
-                          <m:r>
-                            <a:rPr lang="de-CH" b="0" i="1" smtClean="0">
-                              <a:latin typeface="Cambria Math" panose="02040503050406030204" pitchFamily="18" charset="0"/>
-                              <a:ea typeface="Cambria Math" panose="02040503050406030204" pitchFamily="18" charset="0"/>
-                            </a:rPr>
-                            <m:t>2</m:t>
-                          </m:r>
-                        </m:sub>
-                      </m:sSub>
-                      <m:r>
-                        <a:rPr lang="de-CH" b="0" i="1" smtClean="0">
-                          <a:latin typeface="Cambria Math" panose="02040503050406030204" pitchFamily="18" charset="0"/>
-                          <a:ea typeface="Cambria Math" panose="02040503050406030204" pitchFamily="18" charset="0"/>
-                        </a:rPr>
-                        <m:t>)+</m:t>
-                      </m:r>
-                      <m:sSub>
-                        <m:sSubPr>
-                          <m:ctrlPr>
-                            <a:rPr lang="de-CH" b="0" i="1" smtClean="0">
-                              <a:latin typeface="Cambria Math" panose="02040503050406030204" pitchFamily="18" charset="0"/>
-                              <a:ea typeface="Cambria Math" panose="02040503050406030204" pitchFamily="18" charset="0"/>
-                            </a:rPr>
-                          </m:ctrlPr>
-                        </m:sSubPr>
-                        <m:e>
-                          <m:r>
-                            <a:rPr lang="de-CH" b="0" i="1" smtClean="0">
-                              <a:latin typeface="Cambria Math" panose="02040503050406030204" pitchFamily="18" charset="0"/>
-                              <a:ea typeface="Cambria Math" panose="02040503050406030204" pitchFamily="18" charset="0"/>
-                            </a:rPr>
-                            <m:t>𝑏</m:t>
-                          </m:r>
-                        </m:e>
-                        <m:sub>
-                          <m:r>
-                            <a:rPr lang="de-CH" b="0" i="1" smtClean="0">
-                              <a:latin typeface="Cambria Math" panose="02040503050406030204" pitchFamily="18" charset="0"/>
-                              <a:ea typeface="Cambria Math" panose="02040503050406030204" pitchFamily="18" charset="0"/>
-                            </a:rPr>
-                            <m:t>3</m:t>
-                          </m:r>
-                        </m:sub>
-                      </m:sSub>
-                      <m:r>
-                        <a:rPr lang="de-CH" b="0" i="1" smtClean="0">
-                          <a:latin typeface="Cambria Math" panose="02040503050406030204" pitchFamily="18" charset="0"/>
-                          <a:ea typeface="Cambria Math" panose="02040503050406030204" pitchFamily="18" charset="0"/>
-                        </a:rPr>
-                        <m:t>)+</m:t>
-                      </m:r>
-                      <m:sSub>
-                        <m:sSubPr>
-                          <m:ctrlPr>
-                            <a:rPr lang="de-CH" b="0" i="1" smtClean="0">
-                              <a:latin typeface="Cambria Math" panose="02040503050406030204" pitchFamily="18" charset="0"/>
-                              <a:ea typeface="Cambria Math" panose="02040503050406030204" pitchFamily="18" charset="0"/>
-                            </a:rPr>
-                          </m:ctrlPr>
-                        </m:sSubPr>
-                        <m:e>
-                          <m:r>
-                            <a:rPr lang="de-CH" b="0" i="1" smtClean="0">
-                              <a:latin typeface="Cambria Math" panose="02040503050406030204" pitchFamily="18" charset="0"/>
-                              <a:ea typeface="Cambria Math" panose="02040503050406030204" pitchFamily="18" charset="0"/>
-                            </a:rPr>
-                            <m:t>𝑏</m:t>
-                          </m:r>
-                        </m:e>
-                        <m:sub>
-                          <m:r>
-                            <a:rPr lang="de-CH" b="0" i="1" smtClean="0">
-                              <a:latin typeface="Cambria Math" panose="02040503050406030204" pitchFamily="18" charset="0"/>
-                              <a:ea typeface="Cambria Math" panose="02040503050406030204" pitchFamily="18" charset="0"/>
-                            </a:rPr>
-                            <m:t>4</m:t>
-                          </m:r>
-                        </m:sub>
-                      </m:sSub>
-                    </m:oMath>
-                  </m:oMathPara>
-                </a14:m>
-                <a:endParaRPr lang="de-CH" b="0" i="1" dirty="0">
-                  <a:latin typeface="Cambria Math" panose="02040503050406030204" pitchFamily="18" charset="0"/>
-                  <a:ea typeface="Cambria Math" panose="02040503050406030204" pitchFamily="18" charset="0"/>
-                </a:endParaRPr>
-              </a:p>
-              <a:p>
-                <a:pPr marL="457200" lvl="1" indent="0">
-                  <a:buNone/>
-                </a:pPr>
-                <a:endParaRPr lang="de-CH" b="0" i="1" dirty="0">
-                  <a:latin typeface="Cambria Math" panose="02040503050406030204" pitchFamily="18" charset="0"/>
-                  <a:ea typeface="Cambria Math" panose="02040503050406030204" pitchFamily="18" charset="0"/>
-                </a:endParaRPr>
-              </a:p>
-              <a:p>
-                <a:pPr marL="457200" lvl="1" indent="0">
-                  <a:buNone/>
-                </a:pPr>
-                <a14:m>
-                  <m:oMathPara xmlns:m="http://schemas.openxmlformats.org/officeDocument/2006/math">
-                    <m:oMathParaPr>
-                      <m:jc m:val="centerGroup"/>
-                    </m:oMathParaPr>
-                    <m:oMath xmlns:m="http://schemas.openxmlformats.org/officeDocument/2006/math">
-                      <m:r>
-                        <a:rPr lang="de-CH" b="0" i="1" smtClean="0">
-                          <a:latin typeface="Cambria Math" panose="02040503050406030204" pitchFamily="18" charset="0"/>
-                          <a:ea typeface="Cambria Math" panose="02040503050406030204" pitchFamily="18" charset="0"/>
-                        </a:rPr>
-                        <m:t>ℒ</m:t>
-                      </m:r>
-                      <m:d>
-                        <m:dPr>
-                          <m:ctrlPr>
-                            <a:rPr lang="de-CH" b="0" i="1" smtClean="0">
-                              <a:latin typeface="Cambria Math" panose="02040503050406030204" pitchFamily="18" charset="0"/>
-                              <a:ea typeface="Cambria Math" panose="02040503050406030204" pitchFamily="18" charset="0"/>
-                            </a:rPr>
-                          </m:ctrlPr>
-                        </m:dPr>
-                        <m:e>
-                          <m:r>
-                            <a:rPr lang="de-CH" b="0" i="1" smtClean="0">
-                              <a:latin typeface="Cambria Math" panose="02040503050406030204" pitchFamily="18" charset="0"/>
-                              <a:ea typeface="Cambria Math" panose="02040503050406030204" pitchFamily="18" charset="0"/>
-                            </a:rPr>
-                            <m:t>𝜃</m:t>
-                          </m:r>
-                        </m:e>
-                      </m:d>
-                      <m:r>
-                        <a:rPr lang="de-CH" b="0" i="1" smtClean="0">
-                          <a:latin typeface="Cambria Math" panose="02040503050406030204" pitchFamily="18" charset="0"/>
-                          <a:ea typeface="Cambria Math" panose="02040503050406030204" pitchFamily="18" charset="0"/>
-                        </a:rPr>
-                        <m:t>=</m:t>
-                      </m:r>
-                      <m:sSup>
-                        <m:sSupPr>
-                          <m:ctrlPr>
-                            <a:rPr lang="de-CH" b="0" i="1" smtClean="0">
-                              <a:latin typeface="Cambria Math" panose="02040503050406030204" pitchFamily="18" charset="0"/>
-                              <a:ea typeface="Cambria Math" panose="02040503050406030204" pitchFamily="18" charset="0"/>
-                            </a:rPr>
-                          </m:ctrlPr>
-                        </m:sSupPr>
-                        <m:e>
-                          <m:d>
-                            <m:dPr>
-                              <m:ctrlPr>
-                                <a:rPr lang="de-CH" b="0" i="1" smtClean="0">
-                                  <a:latin typeface="Cambria Math" panose="02040503050406030204" pitchFamily="18" charset="0"/>
-                                  <a:ea typeface="Cambria Math" panose="02040503050406030204" pitchFamily="18" charset="0"/>
-                                </a:rPr>
-                              </m:ctrlPr>
-                            </m:dPr>
-                            <m:e>
-                              <m:sSub>
-                                <m:sSubPr>
-                                  <m:ctrlPr>
-                                    <a:rPr lang="de-CH" b="0" i="1" smtClean="0">
-                                      <a:latin typeface="Cambria Math" panose="02040503050406030204" pitchFamily="18" charset="0"/>
-                                      <a:ea typeface="Cambria Math" panose="02040503050406030204" pitchFamily="18" charset="0"/>
-                                    </a:rPr>
-                                  </m:ctrlPr>
-                                </m:sSubPr>
-                                <m:e>
-                                  <m:r>
-                                    <a:rPr lang="de-CH" b="0" i="1" smtClean="0">
-                                      <a:latin typeface="Cambria Math" panose="02040503050406030204" pitchFamily="18" charset="0"/>
-                                      <a:ea typeface="Cambria Math" panose="02040503050406030204" pitchFamily="18" charset="0"/>
-                                    </a:rPr>
-                                    <m:t>𝑓</m:t>
-                                  </m:r>
-                                </m:e>
-                                <m:sub>
-                                  <m:r>
-                                    <a:rPr lang="de-CH" b="0" i="1" smtClean="0">
-                                      <a:latin typeface="Cambria Math" panose="02040503050406030204" pitchFamily="18" charset="0"/>
-                                      <a:ea typeface="Cambria Math" panose="02040503050406030204" pitchFamily="18" charset="0"/>
-                                    </a:rPr>
-                                    <m:t>𝜃</m:t>
-                                  </m:r>
-                                </m:sub>
-                              </m:sSub>
-                              <m:d>
-                                <m:dPr>
-                                  <m:ctrlPr>
-                                    <a:rPr lang="de-CH" b="0" i="1" smtClean="0">
-                                      <a:latin typeface="Cambria Math" panose="02040503050406030204" pitchFamily="18" charset="0"/>
-                                      <a:ea typeface="Cambria Math" panose="02040503050406030204" pitchFamily="18" charset="0"/>
-                                    </a:rPr>
-                                  </m:ctrlPr>
-                                </m:dPr>
-                                <m:e>
-                                  <m:sSub>
-                                    <m:sSubPr>
-                                      <m:ctrlPr>
-                                        <a:rPr lang="de-CH" b="0" i="1" smtClean="0">
-                                          <a:latin typeface="Cambria Math" panose="02040503050406030204" pitchFamily="18" charset="0"/>
-                                          <a:ea typeface="Cambria Math" panose="02040503050406030204" pitchFamily="18" charset="0"/>
-                                        </a:rPr>
-                                      </m:ctrlPr>
-                                    </m:sSubPr>
-                                    <m:e>
-                                      <m:r>
-                                        <a:rPr lang="de-CH" b="0" i="1" smtClean="0">
-                                          <a:latin typeface="Cambria Math" panose="02040503050406030204" pitchFamily="18" charset="0"/>
-                                          <a:ea typeface="Cambria Math" panose="02040503050406030204" pitchFamily="18" charset="0"/>
-                                        </a:rPr>
-                                        <m:t>𝑥</m:t>
-                                      </m:r>
-                                    </m:e>
-                                    <m:sub>
-                                      <m:r>
-                                        <a:rPr lang="de-CH" b="0" i="1" smtClean="0">
-                                          <a:latin typeface="Cambria Math" panose="02040503050406030204" pitchFamily="18" charset="0"/>
-                                          <a:ea typeface="Cambria Math" panose="02040503050406030204" pitchFamily="18" charset="0"/>
-                                        </a:rPr>
-                                        <m:t>1</m:t>
-                                      </m:r>
-                                    </m:sub>
-                                  </m:sSub>
-                                  <m:r>
-                                    <a:rPr lang="de-CH" b="0" i="1" smtClean="0">
-                                      <a:latin typeface="Cambria Math" panose="02040503050406030204" pitchFamily="18" charset="0"/>
-                                      <a:ea typeface="Cambria Math" panose="02040503050406030204" pitchFamily="18" charset="0"/>
-                                    </a:rPr>
-                                    <m:t>,</m:t>
-                                  </m:r>
-                                  <m:sSub>
-                                    <m:sSubPr>
-                                      <m:ctrlPr>
-                                        <a:rPr lang="de-CH" b="0" i="1" smtClean="0">
-                                          <a:latin typeface="Cambria Math" panose="02040503050406030204" pitchFamily="18" charset="0"/>
-                                          <a:ea typeface="Cambria Math" panose="02040503050406030204" pitchFamily="18" charset="0"/>
-                                        </a:rPr>
-                                      </m:ctrlPr>
-                                    </m:sSubPr>
-                                    <m:e>
-                                      <m:r>
-                                        <a:rPr lang="de-CH" b="0" i="1" smtClean="0">
-                                          <a:latin typeface="Cambria Math" panose="02040503050406030204" pitchFamily="18" charset="0"/>
-                                          <a:ea typeface="Cambria Math" panose="02040503050406030204" pitchFamily="18" charset="0"/>
-                                        </a:rPr>
-                                        <m:t>𝑥</m:t>
-                                      </m:r>
-                                    </m:e>
-                                    <m:sub>
-                                      <m:r>
-                                        <a:rPr lang="de-CH" b="0" i="1" smtClean="0">
-                                          <a:latin typeface="Cambria Math" panose="02040503050406030204" pitchFamily="18" charset="0"/>
-                                          <a:ea typeface="Cambria Math" panose="02040503050406030204" pitchFamily="18" charset="0"/>
-                                        </a:rPr>
-                                        <m:t>2</m:t>
-                                      </m:r>
-                                    </m:sub>
-                                  </m:sSub>
-                                </m:e>
-                              </m:d>
-                              <m:r>
-                                <a:rPr lang="de-CH" b="0" i="1" smtClean="0">
-                                  <a:latin typeface="Cambria Math" panose="02040503050406030204" pitchFamily="18" charset="0"/>
-                                  <a:ea typeface="Cambria Math" panose="02040503050406030204" pitchFamily="18" charset="0"/>
-                                </a:rPr>
-                                <m:t>−</m:t>
-                              </m:r>
-                              <m:r>
-                                <a:rPr lang="de-CH" b="0" i="1" smtClean="0">
-                                  <a:latin typeface="Cambria Math" panose="02040503050406030204" pitchFamily="18" charset="0"/>
-                                  <a:ea typeface="Cambria Math" panose="02040503050406030204" pitchFamily="18" charset="0"/>
-                                </a:rPr>
-                                <m:t>𝑦</m:t>
-                              </m:r>
-                            </m:e>
-                          </m:d>
-                        </m:e>
-                        <m:sup>
-                          <m:r>
-                            <a:rPr lang="de-CH" b="0" i="1" smtClean="0">
-                              <a:latin typeface="Cambria Math" panose="02040503050406030204" pitchFamily="18" charset="0"/>
-                              <a:ea typeface="Cambria Math" panose="02040503050406030204" pitchFamily="18" charset="0"/>
-                            </a:rPr>
-                            <m:t>2</m:t>
-                          </m:r>
-                        </m:sup>
-                      </m:sSup>
-                      <m:r>
-                        <a:rPr lang="de-CH" b="0" i="1" smtClean="0">
-                          <a:latin typeface="Cambria Math" panose="02040503050406030204" pitchFamily="18" charset="0"/>
-                          <a:ea typeface="Cambria Math" panose="02040503050406030204" pitchFamily="18" charset="0"/>
-                        </a:rPr>
-                        <m:t> </m:t>
-                      </m:r>
-                    </m:oMath>
-                  </m:oMathPara>
-                </a14:m>
-                <a:endParaRPr lang="de-CH" b="0" dirty="0">
-                  <a:ea typeface="Cambria Math" panose="02040503050406030204" pitchFamily="18" charset="0"/>
-                </a:endParaRPr>
-              </a:p>
-              <a:p>
-                <a:pPr marL="457200" lvl="1" indent="0">
-                  <a:buNone/>
-                </a:pPr>
-                <a:endParaRPr lang="en-GB" dirty="0"/>
-              </a:p>
-            </p:txBody>
-          </p:sp>
-        </mc:Choice>
-        <mc:Fallback>
-          <p:sp>
-            <p:nvSpPr>
-              <p:cNvPr id="3" name="Inhaltsplatzhalter 2">
-                <a:extLst>
-                  <a:ext uri="{FF2B5EF4-FFF2-40B4-BE49-F238E27FC236}">
-                    <a16:creationId xmlns:a16="http://schemas.microsoft.com/office/drawing/2014/main" id="{7AD3E912-5097-5BA8-38E2-6D2320FCF5AB}"/>
-                  </a:ext>
-                </a:extLst>
-              </p:cNvPr>
-              <p:cNvSpPr>
-                <a:spLocks noGrp="1" noRot="1" noChangeAspect="1" noMove="1" noResize="1" noEditPoints="1" noAdjustHandles="1" noChangeArrowheads="1" noChangeShapeType="1" noTextEdit="1"/>
-              </p:cNvSpPr>
-              <p:nvPr>
-                <p:ph idx="1"/>
-              </p:nvPr>
-            </p:nvSpPr>
-            <p:spPr>
-              <a:blipFill>
-                <a:blip r:embed="rId2"/>
-                <a:stretch>
-                  <a:fillRect l="-1043" t="-2381" b="-140"/>
-                </a:stretch>
-              </a:blipFill>
-            </p:spPr>
-            <p:txBody>
-              <a:bodyPr/>
-              <a:lstStyle/>
-              <a:p>
-                <a:r>
-                  <a:rPr lang="en-GB">
-                    <a:noFill/>
-                  </a:rPr>
-                  <a:t> </a:t>
-                </a:r>
-              </a:p>
-            </p:txBody>
-          </p:sp>
-        </mc:Fallback>
-      </mc:AlternateContent>
-      <p:pic>
-        <p:nvPicPr>
-          <p:cNvPr id="4" name="Inhaltsplatzhalter 3">
-            <a:extLst>
-              <a:ext uri="{FF2B5EF4-FFF2-40B4-BE49-F238E27FC236}">
-                <a16:creationId xmlns:a16="http://schemas.microsoft.com/office/drawing/2014/main" id="{A03C55D1-EF18-AE90-1043-0067EA5D5118}"/>
-              </a:ext>
-            </a:extLst>
-          </p:cNvPr>
-          <p:cNvPicPr>
-            <a:picLocks noChangeAspect="1"/>
-          </p:cNvPicPr>
-          <p:nvPr/>
-        </p:nvPicPr>
-        <p:blipFill>
-          <a:blip r:embed="rId3"/>
-          <a:srcRect l="35454" t="13017" r="3127" b="39743"/>
-          <a:stretch>
-            <a:fillRect/>
-          </a:stretch>
-        </p:blipFill>
-        <p:spPr>
-          <a:xfrm>
-            <a:off x="7663705" y="4040540"/>
-            <a:ext cx="4250130" cy="2452335"/>
-          </a:xfrm>
-          <a:prstGeom prst="rect">
-            <a:avLst/>
-          </a:prstGeom>
-        </p:spPr>
-      </p:pic>
-    </p:spTree>
-    <p:extLst>
-      <p:ext uri="{BB962C8B-B14F-4D97-AF65-F5344CB8AC3E}">
-        <p14:creationId xmlns:p14="http://schemas.microsoft.com/office/powerpoint/2010/main" val="3133779779"/>
+        <p14:creationId xmlns:p14="http://schemas.microsoft.com/office/powerpoint/2010/main" val="3940489760"/>
       </p:ext>
     </p:extLst>
   </p:cSld>

</xml_diff>